<commit_message>
expanded prereqs and added what will be covered
</commit_message>
<xml_diff>
--- a/2021-04-29 - PowerShell Summit 2021 - Practically Regexing/PowerShell Summit 2021 - Practically Regexing.pptx
+++ b/2021-04-29 - PowerShell Summit 2021 - Practically Regexing/PowerShell Summit 2021 - Practically Regexing.pptx
@@ -8,8 +8,9 @@
     <p:sldId id="256" r:id="rId2"/>
     <p:sldId id="257" r:id="rId3"/>
     <p:sldId id="269" r:id="rId4"/>
-    <p:sldId id="258" r:id="rId5"/>
-    <p:sldId id="268" r:id="rId6"/>
+    <p:sldId id="270" r:id="rId5"/>
+    <p:sldId id="258" r:id="rId6"/>
+    <p:sldId id="268" r:id="rId7"/>
   </p:sldIdLst>
   <p:sldSz cx="12192000" cy="6858000"/>
   <p:notesSz cx="6858000" cy="9144000"/>
@@ -263,7 +264,7 @@
           <a:p>
             <a:fld id="{D46B952B-F692-4DD1-9678-FCDA40C3FC40}" type="datetimeFigureOut">
               <a:rPr lang="en-US" smtClean="0"/>
-              <a:t>3/15/2021</a:t>
+              <a:t>3/28/2021</a:t>
             </a:fld>
             <a:endParaRPr lang="en-US"/>
           </a:p>
@@ -461,7 +462,7 @@
           <a:p>
             <a:fld id="{D46B952B-F692-4DD1-9678-FCDA40C3FC40}" type="datetimeFigureOut">
               <a:rPr lang="en-US" smtClean="0"/>
-              <a:t>3/15/2021</a:t>
+              <a:t>3/28/2021</a:t>
             </a:fld>
             <a:endParaRPr lang="en-US"/>
           </a:p>
@@ -669,7 +670,7 @@
           <a:p>
             <a:fld id="{D46B952B-F692-4DD1-9678-FCDA40C3FC40}" type="datetimeFigureOut">
               <a:rPr lang="en-US" smtClean="0"/>
-              <a:t>3/15/2021</a:t>
+              <a:t>3/28/2021</a:t>
             </a:fld>
             <a:endParaRPr lang="en-US"/>
           </a:p>
@@ -867,7 +868,7 @@
           <a:p>
             <a:fld id="{D46B952B-F692-4DD1-9678-FCDA40C3FC40}" type="datetimeFigureOut">
               <a:rPr lang="en-US" smtClean="0"/>
-              <a:t>3/15/2021</a:t>
+              <a:t>3/28/2021</a:t>
             </a:fld>
             <a:endParaRPr lang="en-US"/>
           </a:p>
@@ -1142,7 +1143,7 @@
           <a:p>
             <a:fld id="{D46B952B-F692-4DD1-9678-FCDA40C3FC40}" type="datetimeFigureOut">
               <a:rPr lang="en-US" smtClean="0"/>
-              <a:t>3/15/2021</a:t>
+              <a:t>3/28/2021</a:t>
             </a:fld>
             <a:endParaRPr lang="en-US"/>
           </a:p>
@@ -1407,7 +1408,7 @@
           <a:p>
             <a:fld id="{D46B952B-F692-4DD1-9678-FCDA40C3FC40}" type="datetimeFigureOut">
               <a:rPr lang="en-US" smtClean="0"/>
-              <a:t>3/15/2021</a:t>
+              <a:t>3/28/2021</a:t>
             </a:fld>
             <a:endParaRPr lang="en-US"/>
           </a:p>
@@ -1819,7 +1820,7 @@
           <a:p>
             <a:fld id="{D46B952B-F692-4DD1-9678-FCDA40C3FC40}" type="datetimeFigureOut">
               <a:rPr lang="en-US" smtClean="0"/>
-              <a:t>3/15/2021</a:t>
+              <a:t>3/28/2021</a:t>
             </a:fld>
             <a:endParaRPr lang="en-US"/>
           </a:p>
@@ -1960,7 +1961,7 @@
           <a:p>
             <a:fld id="{D46B952B-F692-4DD1-9678-FCDA40C3FC40}" type="datetimeFigureOut">
               <a:rPr lang="en-US" smtClean="0"/>
-              <a:t>3/15/2021</a:t>
+              <a:t>3/28/2021</a:t>
             </a:fld>
             <a:endParaRPr lang="en-US"/>
           </a:p>
@@ -2073,7 +2074,7 @@
           <a:p>
             <a:fld id="{D46B952B-F692-4DD1-9678-FCDA40C3FC40}" type="datetimeFigureOut">
               <a:rPr lang="en-US" smtClean="0"/>
-              <a:t>3/15/2021</a:t>
+              <a:t>3/28/2021</a:t>
             </a:fld>
             <a:endParaRPr lang="en-US"/>
           </a:p>
@@ -2384,7 +2385,7 @@
           <a:p>
             <a:fld id="{D46B952B-F692-4DD1-9678-FCDA40C3FC40}" type="datetimeFigureOut">
               <a:rPr lang="en-US" smtClean="0"/>
-              <a:t>3/15/2021</a:t>
+              <a:t>3/28/2021</a:t>
             </a:fld>
             <a:endParaRPr lang="en-US"/>
           </a:p>
@@ -2672,7 +2673,7 @@
           <a:p>
             <a:fld id="{D46B952B-F692-4DD1-9678-FCDA40C3FC40}" type="datetimeFigureOut">
               <a:rPr lang="en-US" smtClean="0"/>
-              <a:t>3/15/2021</a:t>
+              <a:t>3/28/2021</a:t>
             </a:fld>
             <a:endParaRPr lang="en-US"/>
           </a:p>
@@ -2922,7 +2923,7 @@
           <a:p>
             <a:fld id="{D46B952B-F692-4DD1-9678-FCDA40C3FC40}" type="datetimeFigureOut">
               <a:rPr lang="en-US" smtClean="0"/>
-              <a:t>3/15/2021</a:t>
+              <a:t>3/28/2021</a:t>
             </a:fld>
             <a:endParaRPr lang="en-US"/>
           </a:p>
@@ -4163,6 +4164,53 @@
           <a:p>
             <a:pPr lvl="1"/>
             <a:r>
+              <a:rPr lang="en-US" dirty="0"/>
+              <a:t>Character Classes (\d, \w, \s, [</a:t>
+            </a:r>
+            <a:r>
+              <a:rPr lang="en-US" dirty="0" err="1"/>
+              <a:t>abc</a:t>
+            </a:r>
+            <a:r>
+              <a:rPr lang="en-US" dirty="0"/>
+              <a:t>], [0-9], </a:t>
+            </a:r>
+            <a:r>
+              <a:rPr lang="en-US" dirty="0" err="1"/>
+              <a:t>etc</a:t>
+            </a:r>
+            <a:r>
+              <a:rPr lang="en-US" dirty="0"/>
+              <a:t>)</a:t>
+            </a:r>
+          </a:p>
+          <a:p>
+            <a:pPr lvl="1"/>
+            <a:r>
+              <a:rPr lang="en-US" dirty="0"/>
+              <a:t>Anchors and escapes (^, $, \)</a:t>
+            </a:r>
+          </a:p>
+          <a:p>
+            <a:pPr lvl="1"/>
+            <a:r>
+              <a:rPr lang="en-US" dirty="0"/>
+              <a:t>Quantifiers (*, +, ?, {1,2})</a:t>
+            </a:r>
+          </a:p>
+          <a:p>
+            <a:r>
+              <a:rPr lang="en-US" dirty="0"/>
+              <a:t>Easy ways to catch up or refresh</a:t>
+            </a:r>
+          </a:p>
+          <a:p>
+            <a:pPr lvl="1"/>
+            <a:r>
+              <a:rPr lang="en-US" dirty="0"/>
+              <a:t>Past summit talk: </a:t>
+            </a:r>
+            <a:r>
               <a:rPr lang="en-US" dirty="0">
                 <a:hlinkClick r:id="rId2"/>
               </a:rPr>
@@ -4171,6 +4219,26 @@
             <a:endParaRPr lang="en-US" dirty="0"/>
           </a:p>
           <a:p>
+            <a:pPr lvl="1"/>
+            <a:r>
+              <a:rPr lang="en-US" dirty="0"/>
+              <a:t>MS Docs: </a:t>
+            </a:r>
+            <a:r>
+              <a:rPr lang="en-US" dirty="0" err="1">
+                <a:hlinkClick r:id="rId3"/>
+              </a:rPr>
+              <a:t>about_Regular_Expressions</a:t>
+            </a:r>
+            <a:r>
+              <a:rPr lang="en-US" dirty="0">
+                <a:hlinkClick r:id="rId3"/>
+              </a:rPr>
+              <a:t> - PowerShell | Microsoft Docs</a:t>
+            </a:r>
+            <a:endParaRPr lang="en-US" dirty="0"/>
+          </a:p>
+          <a:p>
             <a:r>
               <a:rPr lang="en-US" dirty="0"/>
               <a:t>An understanding of PowerShell</a:t>
@@ -4180,8 +4248,15 @@
             <a:pPr lvl="1"/>
             <a:r>
               <a:rPr lang="en-US" dirty="0"/>
-              <a:t>Duh</a:t>
-            </a:r>
+              <a:t>It is the PowerShell Summit after all </a:t>
+            </a:r>
+            <a:r>
+              <a:rPr lang="en-US" dirty="0">
+                <a:sym typeface="Wingdings" panose="05000000000000000000" pitchFamily="2" charset="2"/>
+              </a:rPr>
+              <a:t></a:t>
+            </a:r>
+            <a:endParaRPr lang="en-US" dirty="0"/>
           </a:p>
         </p:txBody>
       </p:sp>
@@ -4199,6 +4274,147 @@
 </file>
 
 <file path=ppt/slides/slide4.xml><?xml version="1.0" encoding="utf-8"?>
+<p:sld xmlns:a="http://schemas.openxmlformats.org/drawingml/2006/main" xmlns:r="http://schemas.openxmlformats.org/officeDocument/2006/relationships" xmlns:p="http://schemas.openxmlformats.org/presentationml/2006/main">
+  <p:cSld>
+    <p:spTree>
+      <p:nvGrpSpPr>
+        <p:cNvPr id="1" name=""/>
+        <p:cNvGrpSpPr/>
+        <p:nvPr/>
+      </p:nvGrpSpPr>
+      <p:grpSpPr>
+        <a:xfrm>
+          <a:off x="0" y="0"/>
+          <a:ext cx="0" cy="0"/>
+          <a:chOff x="0" y="0"/>
+          <a:chExt cx="0" cy="0"/>
+        </a:xfrm>
+      </p:grpSpPr>
+      <p:sp>
+        <p:nvSpPr>
+          <p:cNvPr id="2" name="Title 1">
+            <a:extLst>
+              <a:ext uri="{FF2B5EF4-FFF2-40B4-BE49-F238E27FC236}">
+                <a16:creationId xmlns:a16="http://schemas.microsoft.com/office/drawing/2014/main" id="{CE79D370-1344-421B-BC49-98D12941EA64}"/>
+              </a:ext>
+            </a:extLst>
+          </p:cNvPr>
+          <p:cNvSpPr>
+            <a:spLocks noGrp="1"/>
+          </p:cNvSpPr>
+          <p:nvPr>
+            <p:ph type="title"/>
+          </p:nvPr>
+        </p:nvSpPr>
+        <p:spPr/>
+        <p:txBody>
+          <a:bodyPr/>
+          <a:lstStyle/>
+          <a:p>
+            <a:r>
+              <a:rPr lang="en-US" dirty="0"/>
+              <a:t>What we will cover using demos	</a:t>
+            </a:r>
+          </a:p>
+        </p:txBody>
+      </p:sp>
+      <p:sp>
+        <p:nvSpPr>
+          <p:cNvPr id="3" name="Content Placeholder 2">
+            <a:extLst>
+              <a:ext uri="{FF2B5EF4-FFF2-40B4-BE49-F238E27FC236}">
+                <a16:creationId xmlns:a16="http://schemas.microsoft.com/office/drawing/2014/main" id="{DD44E07B-69A5-4615-8EED-BCC8C8AC1934}"/>
+              </a:ext>
+            </a:extLst>
+          </p:cNvPr>
+          <p:cNvSpPr>
+            <a:spLocks noGrp="1"/>
+          </p:cNvSpPr>
+          <p:nvPr>
+            <p:ph idx="1"/>
+          </p:nvPr>
+        </p:nvSpPr>
+        <p:spPr/>
+        <p:txBody>
+          <a:bodyPr/>
+          <a:lstStyle/>
+          <a:p>
+            <a:r>
+              <a:rPr lang="en-US" dirty="0"/>
+              <a:t>Explanations as we go!</a:t>
+            </a:r>
+          </a:p>
+          <a:p>
+            <a:pPr lvl="1"/>
+            <a:r>
+              <a:rPr lang="en-US" dirty="0"/>
+              <a:t>If you aren’t super familiar with some of the prerequisite topics mentioned previously, I will be explaining as I go.</a:t>
+            </a:r>
+          </a:p>
+          <a:p>
+            <a:r>
+              <a:rPr lang="en-US" dirty="0"/>
+              <a:t>Groups</a:t>
+            </a:r>
+          </a:p>
+          <a:p>
+            <a:pPr lvl="1"/>
+            <a:r>
+              <a:rPr lang="en-US" dirty="0"/>
+              <a:t>Normal groups: ()</a:t>
+            </a:r>
+          </a:p>
+          <a:p>
+            <a:pPr lvl="1"/>
+            <a:r>
+              <a:rPr lang="en-US" dirty="0"/>
+              <a:t>Named groups: (?&lt;name&gt;)</a:t>
+            </a:r>
+          </a:p>
+          <a:p>
+            <a:pPr lvl="1"/>
+            <a:r>
+              <a:rPr lang="en-US" dirty="0"/>
+              <a:t>Non capturing groups: (?:)</a:t>
+            </a:r>
+          </a:p>
+          <a:p>
+            <a:r>
+              <a:rPr lang="en-US" dirty="0"/>
+              <a:t>Select-String</a:t>
+            </a:r>
+          </a:p>
+          <a:p>
+            <a:pPr lvl="1"/>
+            <a:r>
+              <a:rPr lang="en-US" dirty="0"/>
+              <a:t>-</a:t>
+            </a:r>
+            <a:r>
+              <a:rPr lang="en-US" dirty="0" err="1"/>
+              <a:t>AllMatches</a:t>
+            </a:r>
+            <a:endParaRPr lang="en-US" dirty="0"/>
+          </a:p>
+          <a:p>
+            <a:endParaRPr lang="en-US" dirty="0"/>
+          </a:p>
+        </p:txBody>
+      </p:sp>
+    </p:spTree>
+    <p:extLst>
+      <p:ext uri="{BB962C8B-B14F-4D97-AF65-F5344CB8AC3E}">
+        <p14:creationId xmlns:p14="http://schemas.microsoft.com/office/powerpoint/2010/main" val="215085246"/>
+      </p:ext>
+    </p:extLst>
+  </p:cSld>
+  <p:clrMapOvr>
+    <a:masterClrMapping/>
+  </p:clrMapOvr>
+</p:sld>
+</file>
+
+<file path=ppt/slides/slide5.xml><?xml version="1.0" encoding="utf-8"?>
 <p:sld xmlns:a="http://schemas.openxmlformats.org/drawingml/2006/main" xmlns:r="http://schemas.openxmlformats.org/officeDocument/2006/relationships" xmlns:p="http://schemas.openxmlformats.org/presentationml/2006/main">
   <p:cSld>
     <p:spTree>
@@ -4799,7 +5015,7 @@
 </p:sld>
 </file>
 
-<file path=ppt/slides/slide5.xml><?xml version="1.0" encoding="utf-8"?>
+<file path=ppt/slides/slide6.xml><?xml version="1.0" encoding="utf-8"?>
 <p:sld xmlns:a="http://schemas.openxmlformats.org/drawingml/2006/main" xmlns:r="http://schemas.openxmlformats.org/officeDocument/2006/relationships" xmlns:p="http://schemas.openxmlformats.org/presentationml/2006/main">
   <p:cSld>
     <p:spTree>

</xml_diff>